<commit_message>
minor changes to site nomenclature
</commit_message>
<xml_diff>
--- a/DillonEtAlSubmission/DillonEtAlFigures2.pptx
+++ b/DillonEtAlSubmission/DillonEtAlFigures2.pptx
@@ -306,7 +306,7 @@
           <a:p>
             <a:fld id="{431E75F3-9ABA-8240-978A-A88201D50A18}" type="datetimeFigureOut">
               <a:rPr lang="en-US" smtClean="0"/>
-              <a:t>3/14/18</a:t>
+              <a:t>8/2/18</a:t>
             </a:fld>
             <a:endParaRPr lang="en-US"/>
           </a:p>
@@ -476,7 +476,7 @@
           <a:p>
             <a:fld id="{431E75F3-9ABA-8240-978A-A88201D50A18}" type="datetimeFigureOut">
               <a:rPr lang="en-US" smtClean="0"/>
-              <a:t>3/14/18</a:t>
+              <a:t>8/2/18</a:t>
             </a:fld>
             <a:endParaRPr lang="en-US"/>
           </a:p>
@@ -656,7 +656,7 @@
           <a:p>
             <a:fld id="{431E75F3-9ABA-8240-978A-A88201D50A18}" type="datetimeFigureOut">
               <a:rPr lang="en-US" smtClean="0"/>
-              <a:t>3/14/18</a:t>
+              <a:t>8/2/18</a:t>
             </a:fld>
             <a:endParaRPr lang="en-US"/>
           </a:p>
@@ -826,7 +826,7 @@
           <a:p>
             <a:fld id="{431E75F3-9ABA-8240-978A-A88201D50A18}" type="datetimeFigureOut">
               <a:rPr lang="en-US" smtClean="0"/>
-              <a:t>3/14/18</a:t>
+              <a:t>8/2/18</a:t>
             </a:fld>
             <a:endParaRPr lang="en-US"/>
           </a:p>
@@ -1072,7 +1072,7 @@
           <a:p>
             <a:fld id="{431E75F3-9ABA-8240-978A-A88201D50A18}" type="datetimeFigureOut">
               <a:rPr lang="en-US" smtClean="0"/>
-              <a:t>3/14/18</a:t>
+              <a:t>8/2/18</a:t>
             </a:fld>
             <a:endParaRPr lang="en-US"/>
           </a:p>
@@ -1360,7 +1360,7 @@
           <a:p>
             <a:fld id="{431E75F3-9ABA-8240-978A-A88201D50A18}" type="datetimeFigureOut">
               <a:rPr lang="en-US" smtClean="0"/>
-              <a:t>3/14/18</a:t>
+              <a:t>8/2/18</a:t>
             </a:fld>
             <a:endParaRPr lang="en-US"/>
           </a:p>
@@ -1782,7 +1782,7 @@
           <a:p>
             <a:fld id="{431E75F3-9ABA-8240-978A-A88201D50A18}" type="datetimeFigureOut">
               <a:rPr lang="en-US" smtClean="0"/>
-              <a:t>3/14/18</a:t>
+              <a:t>8/2/18</a:t>
             </a:fld>
             <a:endParaRPr lang="en-US"/>
           </a:p>
@@ -1900,7 +1900,7 @@
           <a:p>
             <a:fld id="{431E75F3-9ABA-8240-978A-A88201D50A18}" type="datetimeFigureOut">
               <a:rPr lang="en-US" smtClean="0"/>
-              <a:t>3/14/18</a:t>
+              <a:t>8/2/18</a:t>
             </a:fld>
             <a:endParaRPr lang="en-US"/>
           </a:p>
@@ -1995,7 +1995,7 @@
           <a:p>
             <a:fld id="{431E75F3-9ABA-8240-978A-A88201D50A18}" type="datetimeFigureOut">
               <a:rPr lang="en-US" smtClean="0"/>
-              <a:t>3/14/18</a:t>
+              <a:t>8/2/18</a:t>
             </a:fld>
             <a:endParaRPr lang="en-US"/>
           </a:p>
@@ -2272,7 +2272,7 @@
           <a:p>
             <a:fld id="{431E75F3-9ABA-8240-978A-A88201D50A18}" type="datetimeFigureOut">
               <a:rPr lang="en-US" smtClean="0"/>
-              <a:t>3/14/18</a:t>
+              <a:t>8/2/18</a:t>
             </a:fld>
             <a:endParaRPr lang="en-US"/>
           </a:p>
@@ -2525,7 +2525,7 @@
           <a:p>
             <a:fld id="{431E75F3-9ABA-8240-978A-A88201D50A18}" type="datetimeFigureOut">
               <a:rPr lang="en-US" smtClean="0"/>
-              <a:t>3/14/18</a:t>
+              <a:t>8/2/18</a:t>
             </a:fld>
             <a:endParaRPr lang="en-US"/>
           </a:p>
@@ -2738,7 +2738,7 @@
           <a:p>
             <a:fld id="{431E75F3-9ABA-8240-978A-A88201D50A18}" type="datetimeFigureOut">
               <a:rPr lang="en-US" smtClean="0"/>
-              <a:t>3/14/18</a:t>
+              <a:t>8/2/18</a:t>
             </a:fld>
             <a:endParaRPr lang="en-US"/>
           </a:p>
@@ -3187,7 +3187,7 @@
             <a:graphicData uri="http://schemas.openxmlformats.org/presentationml/2006/ole">
               <mc:AlternateContent xmlns:mc="http://schemas.openxmlformats.org/markup-compatibility/2006">
                 <mc:Choice xmlns:v="urn:schemas-microsoft-com:vml" Requires="v">
-                  <p:oleObj spid="_x0000_s2080" name="Equation" r:id="rId3" imgW="533400" imgH="203200" progId="Equation.3">
+                  <p:oleObj spid="_x0000_s2085" name="Equation" r:id="rId3" imgW="533400" imgH="203200" progId="Equation.3">
                     <p:embed/>
                   </p:oleObj>
                 </mc:Choice>
@@ -3616,7 +3616,7 @@
             <a:graphicData uri="http://schemas.openxmlformats.org/presentationml/2006/ole">
               <mc:AlternateContent xmlns:mc="http://schemas.openxmlformats.org/markup-compatibility/2006">
                 <mc:Choice xmlns:v="urn:schemas-microsoft-com:vml" Requires="v">
-                  <p:oleObj spid="_x0000_s2081" name="Equation" r:id="rId5" imgW="584200" imgH="203200" progId="Equation.3">
+                  <p:oleObj spid="_x0000_s2086" name="Equation" r:id="rId5" imgW="584200" imgH="203200" progId="Equation.3">
                     <p:embed/>
                   </p:oleObj>
                 </mc:Choice>
@@ -4297,14 +4297,14 @@
           <a:effectLst/>
           <a:extLst>
             <a:ext uri="{909E8E84-426E-40dd-AFC4-6F175D3DCCD1}">
-              <a14:hiddenFill xmlns="" xmlns:a14="http://schemas.microsoft.com/office/drawing/2010/main">
+              <a14:hiddenFill xmlns:a14="http://schemas.microsoft.com/office/drawing/2010/main" xmlns="">
                 <a:solidFill>
                   <a:schemeClr val="accent1"/>
                 </a:solidFill>
               </a14:hiddenFill>
             </a:ext>
             <a:ext uri="{AF507438-7753-43e0-B8FC-AC1667EBCBE1}">
-              <a14:hiddenEffects xmlns="" xmlns:a14="http://schemas.microsoft.com/office/drawing/2010/main">
+              <a14:hiddenEffects xmlns:a14="http://schemas.microsoft.com/office/drawing/2010/main" xmlns="">
                 <a:effectLst>
                   <a:outerShdw blurRad="63500" dist="38099" dir="2700000" algn="ctr" rotWithShape="0">
                     <a:schemeClr val="bg2">
@@ -4359,6 +4359,13 @@
   <p:clrMapOvr>
     <a:masterClrMapping/>
   </p:clrMapOvr>
+  <p:timing>
+    <p:tnLst>
+      <p:par>
+        <p:cTn id="1" dur="indefinite" restart="never" nodeType="tmRoot"/>
+      </p:par>
+    </p:tnLst>
+  </p:timing>
 </p:sld>
 </file>
 
@@ -4405,14 +4412,14 @@
           <a:effectLst/>
           <a:extLst>
             <a:ext uri="{909E8E84-426E-40dd-AFC4-6F175D3DCCD1}">
-              <a14:hiddenFill xmlns="" xmlns:a14="http://schemas.microsoft.com/office/drawing/2010/main">
+              <a14:hiddenFill xmlns:a14="http://schemas.microsoft.com/office/drawing/2010/main" xmlns="">
                 <a:solidFill>
                   <a:schemeClr val="accent1"/>
                 </a:solidFill>
               </a14:hiddenFill>
             </a:ext>
             <a:ext uri="{AF507438-7753-43e0-B8FC-AC1667EBCBE1}">
-              <a14:hiddenEffects xmlns="" xmlns:a14="http://schemas.microsoft.com/office/drawing/2010/main">
+              <a14:hiddenEffects xmlns:a14="http://schemas.microsoft.com/office/drawing/2010/main" xmlns="">
                 <a:effectLst>
                   <a:outerShdw blurRad="63500" dist="38099" dir="2700000" algn="ctr" rotWithShape="0">
                     <a:schemeClr val="bg2">
@@ -4817,93 +4824,6 @@
           </a:prstGeom>
         </p:spPr>
       </p:pic>
-      <p:pic>
-        <p:nvPicPr>
-          <p:cNvPr id="39" name="Picture 38"/>
-          <p:cNvPicPr>
-            <a:picLocks noChangeAspect="1"/>
-          </p:cNvPicPr>
-          <p:nvPr/>
-        </p:nvPicPr>
-        <p:blipFill rotWithShape="1">
-          <a:blip r:embed="rId11">
-            <a:extLst>
-              <a:ext uri="{28A0092B-C50C-407E-A947-70E740481C1C}">
-                <a14:useLocalDpi xmlns:a14="http://schemas.microsoft.com/office/drawing/2010/main" val="0"/>
-              </a:ext>
-            </a:extLst>
-          </a:blip>
-          <a:srcRect l="4717"/>
-          <a:stretch/>
-        </p:blipFill>
-        <p:spPr>
-          <a:xfrm>
-            <a:off x="2579927" y="3425244"/>
-            <a:ext cx="2265317" cy="1828800"/>
-          </a:xfrm>
-          <a:prstGeom prst="rect">
-            <a:avLst/>
-          </a:prstGeom>
-        </p:spPr>
-      </p:pic>
-      <p:pic>
-        <p:nvPicPr>
-          <p:cNvPr id="40" name="Picture 39"/>
-          <p:cNvPicPr>
-            <a:picLocks noChangeAspect="1"/>
-          </p:cNvPicPr>
-          <p:nvPr/>
-        </p:nvPicPr>
-        <p:blipFill rotWithShape="1">
-          <a:blip r:embed="rId12">
-            <a:extLst>
-              <a:ext uri="{28A0092B-C50C-407E-A947-70E740481C1C}">
-                <a14:useLocalDpi xmlns:a14="http://schemas.microsoft.com/office/drawing/2010/main" val="0"/>
-              </a:ext>
-            </a:extLst>
-          </a:blip>
-          <a:srcRect l="5542"/>
-          <a:stretch/>
-        </p:blipFill>
-        <p:spPr>
-          <a:xfrm>
-            <a:off x="4724660" y="3425244"/>
-            <a:ext cx="2245676" cy="1828800"/>
-          </a:xfrm>
-          <a:prstGeom prst="rect">
-            <a:avLst/>
-          </a:prstGeom>
-        </p:spPr>
-      </p:pic>
-      <p:pic>
-        <p:nvPicPr>
-          <p:cNvPr id="41" name="Picture 40"/>
-          <p:cNvPicPr>
-            <a:picLocks noChangeAspect="1"/>
-          </p:cNvPicPr>
-          <p:nvPr/>
-        </p:nvPicPr>
-        <p:blipFill rotWithShape="1">
-          <a:blip r:embed="rId13">
-            <a:extLst>
-              <a:ext uri="{28A0092B-C50C-407E-A947-70E740481C1C}">
-                <a14:useLocalDpi xmlns:a14="http://schemas.microsoft.com/office/drawing/2010/main" val="0"/>
-              </a:ext>
-            </a:extLst>
-          </a:blip>
-          <a:srcRect l="4693"/>
-          <a:stretch/>
-        </p:blipFill>
-        <p:spPr>
-          <a:xfrm>
-            <a:off x="6877587" y="3422184"/>
-            <a:ext cx="2265863" cy="1828800"/>
-          </a:xfrm>
-          <a:prstGeom prst="rect">
-            <a:avLst/>
-          </a:prstGeom>
-        </p:spPr>
-      </p:pic>
       <p:grpSp>
         <p:nvGrpSpPr>
           <p:cNvPr id="4" name="Group 3"/>
@@ -4946,14 +4866,14 @@
             <a:effectLst/>
             <a:extLst>
               <a:ext uri="{909E8E84-426E-40dd-AFC4-6F175D3DCCD1}">
-                <a14:hiddenFill xmlns="" xmlns:a14="http://schemas.microsoft.com/office/drawing/2010/main">
+                <a14:hiddenFill xmlns:a14="http://schemas.microsoft.com/office/drawing/2010/main" xmlns="">
                   <a:solidFill>
                     <a:schemeClr val="accent1"/>
                   </a:solidFill>
                 </a14:hiddenFill>
               </a:ext>
               <a:ext uri="{AF507438-7753-43e0-B8FC-AC1667EBCBE1}">
-                <a14:hiddenEffects xmlns="" xmlns:a14="http://schemas.microsoft.com/office/drawing/2010/main">
+                <a14:hiddenEffects xmlns:a14="http://schemas.microsoft.com/office/drawing/2010/main" xmlns="">
                   <a:effectLst>
                     <a:outerShdw blurRad="63500" dist="38099" dir="2700000" algn="ctr" rotWithShape="0">
                       <a:schemeClr val="bg2">
@@ -5087,14 +5007,14 @@
             <a:effectLst/>
             <a:extLst>
               <a:ext uri="{909E8E84-426E-40dd-AFC4-6F175D3DCCD1}">
-                <a14:hiddenFill xmlns="" xmlns:a14="http://schemas.microsoft.com/office/drawing/2010/main">
+                <a14:hiddenFill xmlns:a14="http://schemas.microsoft.com/office/drawing/2010/main" xmlns="">
                   <a:solidFill>
                     <a:schemeClr val="accent1"/>
                   </a:solidFill>
                 </a14:hiddenFill>
               </a:ext>
               <a:ext uri="{AF507438-7753-43e0-B8FC-AC1667EBCBE1}">
-                <a14:hiddenEffects xmlns="" xmlns:a14="http://schemas.microsoft.com/office/drawing/2010/main">
+                <a14:hiddenEffects xmlns:a14="http://schemas.microsoft.com/office/drawing/2010/main" xmlns="">
                   <a:effectLst>
                     <a:outerShdw blurRad="63500" dist="38099" dir="2700000" algn="ctr" rotWithShape="0">
                       <a:schemeClr val="bg2">
@@ -5228,14 +5148,14 @@
             <a:effectLst/>
             <a:extLst>
               <a:ext uri="{909E8E84-426E-40dd-AFC4-6F175D3DCCD1}">
-                <a14:hiddenFill xmlns="" xmlns:a14="http://schemas.microsoft.com/office/drawing/2010/main">
+                <a14:hiddenFill xmlns:a14="http://schemas.microsoft.com/office/drawing/2010/main" xmlns="">
                   <a:solidFill>
                     <a:schemeClr val="accent1"/>
                   </a:solidFill>
                 </a14:hiddenFill>
               </a:ext>
               <a:ext uri="{AF507438-7753-43e0-B8FC-AC1667EBCBE1}">
-                <a14:hiddenEffects xmlns="" xmlns:a14="http://schemas.microsoft.com/office/drawing/2010/main">
+                <a14:hiddenEffects xmlns:a14="http://schemas.microsoft.com/office/drawing/2010/main" xmlns="">
                   <a:effectLst>
                     <a:outerShdw blurRad="63500" dist="38099" dir="2700000" algn="ctr" rotWithShape="0">
                       <a:schemeClr val="bg2">
@@ -5383,14 +5303,14 @@
             <a:effectLst/>
             <a:extLst>
               <a:ext uri="{909E8E84-426E-40dd-AFC4-6F175D3DCCD1}">
-                <a14:hiddenFill xmlns="" xmlns:a14="http://schemas.microsoft.com/office/drawing/2010/main">
+                <a14:hiddenFill xmlns:a14="http://schemas.microsoft.com/office/drawing/2010/main" xmlns="">
                   <a:solidFill>
                     <a:schemeClr val="accent1"/>
                   </a:solidFill>
                 </a14:hiddenFill>
               </a:ext>
               <a:ext uri="{AF507438-7753-43e0-B8FC-AC1667EBCBE1}">
-                <a14:hiddenEffects xmlns="" xmlns:a14="http://schemas.microsoft.com/office/drawing/2010/main">
+                <a14:hiddenEffects xmlns:a14="http://schemas.microsoft.com/office/drawing/2010/main" xmlns="">
                   <a:effectLst>
                     <a:outerShdw blurRad="63500" dist="38099" dir="2700000" algn="ctr" rotWithShape="0">
                       <a:schemeClr val="bg2">
@@ -5538,14 +5458,14 @@
             <a:effectLst/>
             <a:extLst>
               <a:ext uri="{909E8E84-426E-40dd-AFC4-6F175D3DCCD1}">
-                <a14:hiddenFill xmlns="" xmlns:a14="http://schemas.microsoft.com/office/drawing/2010/main">
+                <a14:hiddenFill xmlns:a14="http://schemas.microsoft.com/office/drawing/2010/main" xmlns="">
                   <a:solidFill>
                     <a:schemeClr val="accent1"/>
                   </a:solidFill>
                 </a14:hiddenFill>
               </a:ext>
               <a:ext uri="{AF507438-7753-43e0-B8FC-AC1667EBCBE1}">
-                <a14:hiddenEffects xmlns="" xmlns:a14="http://schemas.microsoft.com/office/drawing/2010/main">
+                <a14:hiddenEffects xmlns:a14="http://schemas.microsoft.com/office/drawing/2010/main" xmlns="">
                   <a:effectLst>
                     <a:outerShdw blurRad="63500" dist="38099" dir="2700000" algn="ctr" rotWithShape="0">
                       <a:schemeClr val="bg2">
@@ -5693,14 +5613,14 @@
             <a:effectLst/>
             <a:extLst>
               <a:ext uri="{909E8E84-426E-40dd-AFC4-6F175D3DCCD1}">
-                <a14:hiddenFill xmlns="" xmlns:a14="http://schemas.microsoft.com/office/drawing/2010/main">
+                <a14:hiddenFill xmlns:a14="http://schemas.microsoft.com/office/drawing/2010/main" xmlns="">
                   <a:solidFill>
                     <a:schemeClr val="accent1"/>
                   </a:solidFill>
                 </a14:hiddenFill>
               </a:ext>
               <a:ext uri="{AF507438-7753-43e0-B8FC-AC1667EBCBE1}">
-                <a14:hiddenEffects xmlns="" xmlns:a14="http://schemas.microsoft.com/office/drawing/2010/main">
+                <a14:hiddenEffects xmlns:a14="http://schemas.microsoft.com/office/drawing/2010/main" xmlns="">
                   <a:effectLst>
                     <a:outerShdw blurRad="63500" dist="38099" dir="2700000" algn="ctr" rotWithShape="0">
                       <a:schemeClr val="bg2">
@@ -5848,14 +5768,14 @@
             <a:effectLst/>
             <a:extLst>
               <a:ext uri="{909E8E84-426E-40dd-AFC4-6F175D3DCCD1}">
-                <a14:hiddenFill xmlns="" xmlns:a14="http://schemas.microsoft.com/office/drawing/2010/main">
+                <a14:hiddenFill xmlns:a14="http://schemas.microsoft.com/office/drawing/2010/main" xmlns="">
                   <a:solidFill>
                     <a:schemeClr val="accent1"/>
                   </a:solidFill>
                 </a14:hiddenFill>
               </a:ext>
               <a:ext uri="{AF507438-7753-43e0-B8FC-AC1667EBCBE1}">
-                <a14:hiddenEffects xmlns="" xmlns:a14="http://schemas.microsoft.com/office/drawing/2010/main">
+                <a14:hiddenEffects xmlns:a14="http://schemas.microsoft.com/office/drawing/2010/main" xmlns="">
                   <a:effectLst>
                     <a:outerShdw blurRad="63500" dist="38099" dir="2700000" algn="ctr" rotWithShape="0">
                       <a:schemeClr val="bg2">
@@ -6003,14 +5923,14 @@
             <a:effectLst/>
             <a:extLst>
               <a:ext uri="{909E8E84-426E-40dd-AFC4-6F175D3DCCD1}">
-                <a14:hiddenFill xmlns="" xmlns:a14="http://schemas.microsoft.com/office/drawing/2010/main">
+                <a14:hiddenFill xmlns:a14="http://schemas.microsoft.com/office/drawing/2010/main" xmlns="">
                   <a:solidFill>
                     <a:schemeClr val="accent1"/>
                   </a:solidFill>
                 </a14:hiddenFill>
               </a:ext>
               <a:ext uri="{AF507438-7753-43e0-B8FC-AC1667EBCBE1}">
-                <a14:hiddenEffects xmlns="" xmlns:a14="http://schemas.microsoft.com/office/drawing/2010/main">
+                <a14:hiddenEffects xmlns:a14="http://schemas.microsoft.com/office/drawing/2010/main" xmlns="">
                   <a:effectLst>
                     <a:outerShdw blurRad="63500" dist="38099" dir="2700000" algn="ctr" rotWithShape="0">
                       <a:schemeClr val="bg2">
@@ -6158,14 +6078,14 @@
             <a:effectLst/>
             <a:extLst>
               <a:ext uri="{909E8E84-426E-40dd-AFC4-6F175D3DCCD1}">
-                <a14:hiddenFill xmlns="" xmlns:a14="http://schemas.microsoft.com/office/drawing/2010/main">
+                <a14:hiddenFill xmlns:a14="http://schemas.microsoft.com/office/drawing/2010/main" xmlns="">
                   <a:solidFill>
                     <a:schemeClr val="accent1"/>
                   </a:solidFill>
                 </a14:hiddenFill>
               </a:ext>
               <a:ext uri="{AF507438-7753-43e0-B8FC-AC1667EBCBE1}">
-                <a14:hiddenEffects xmlns="" xmlns:a14="http://schemas.microsoft.com/office/drawing/2010/main">
+                <a14:hiddenEffects xmlns:a14="http://schemas.microsoft.com/office/drawing/2010/main" xmlns="">
                   <a:effectLst>
                     <a:outerShdw blurRad="63500" dist="38099" dir="2700000" algn="ctr" rotWithShape="0">
                       <a:schemeClr val="bg2">
@@ -6313,14 +6233,14 @@
             <a:effectLst/>
             <a:extLst>
               <a:ext uri="{909E8E84-426E-40dd-AFC4-6F175D3DCCD1}">
-                <a14:hiddenFill xmlns="" xmlns:a14="http://schemas.microsoft.com/office/drawing/2010/main">
+                <a14:hiddenFill xmlns:a14="http://schemas.microsoft.com/office/drawing/2010/main" xmlns="">
                   <a:solidFill>
                     <a:schemeClr val="accent1"/>
                   </a:solidFill>
                 </a14:hiddenFill>
               </a:ext>
               <a:ext uri="{AF507438-7753-43e0-B8FC-AC1667EBCBE1}">
-                <a14:hiddenEffects xmlns="" xmlns:a14="http://schemas.microsoft.com/office/drawing/2010/main">
+                <a14:hiddenEffects xmlns:a14="http://schemas.microsoft.com/office/drawing/2010/main" xmlns="">
                   <a:effectLst>
                     <a:outerShdw blurRad="63500" dist="38099" dir="2700000" algn="ctr" rotWithShape="0">
                       <a:schemeClr val="bg2">
@@ -6468,14 +6388,14 @@
             <a:effectLst/>
             <a:extLst>
               <a:ext uri="{909E8E84-426E-40dd-AFC4-6F175D3DCCD1}">
-                <a14:hiddenFill xmlns="" xmlns:a14="http://schemas.microsoft.com/office/drawing/2010/main">
+                <a14:hiddenFill xmlns:a14="http://schemas.microsoft.com/office/drawing/2010/main" xmlns="">
                   <a:solidFill>
                     <a:schemeClr val="accent1"/>
                   </a:solidFill>
                 </a14:hiddenFill>
               </a:ext>
               <a:ext uri="{AF507438-7753-43e0-B8FC-AC1667EBCBE1}">
-                <a14:hiddenEffects xmlns="" xmlns:a14="http://schemas.microsoft.com/office/drawing/2010/main">
+                <a14:hiddenEffects xmlns:a14="http://schemas.microsoft.com/office/drawing/2010/main" xmlns="">
                   <a:effectLst>
                     <a:outerShdw blurRad="63500" dist="38099" dir="2700000" algn="ctr" rotWithShape="0">
                       <a:schemeClr val="bg2">
@@ -6623,14 +6543,14 @@
             <a:effectLst/>
             <a:extLst>
               <a:ext uri="{909E8E84-426E-40dd-AFC4-6F175D3DCCD1}">
-                <a14:hiddenFill xmlns="" xmlns:a14="http://schemas.microsoft.com/office/drawing/2010/main">
+                <a14:hiddenFill xmlns:a14="http://schemas.microsoft.com/office/drawing/2010/main" xmlns="">
                   <a:solidFill>
                     <a:schemeClr val="accent1"/>
                   </a:solidFill>
                 </a14:hiddenFill>
               </a:ext>
               <a:ext uri="{AF507438-7753-43e0-B8FC-AC1667EBCBE1}">
-                <a14:hiddenEffects xmlns="" xmlns:a14="http://schemas.microsoft.com/office/drawing/2010/main">
+                <a14:hiddenEffects xmlns:a14="http://schemas.microsoft.com/office/drawing/2010/main" xmlns="">
                   <a:effectLst>
                     <a:outerShdw blurRad="63500" dist="38099" dir="2700000" algn="ctr" rotWithShape="0">
                       <a:schemeClr val="bg2">
@@ -7001,6 +6921,93 @@
           </a:p>
         </p:txBody>
       </p:sp>
+      <p:pic>
+        <p:nvPicPr>
+          <p:cNvPr id="5" name="Picture 4"/>
+          <p:cNvPicPr>
+            <a:picLocks noChangeAspect="1"/>
+          </p:cNvPicPr>
+          <p:nvPr/>
+        </p:nvPicPr>
+        <p:blipFill rotWithShape="1">
+          <a:blip r:embed="rId11">
+            <a:extLst>
+              <a:ext uri="{28A0092B-C50C-407E-A947-70E740481C1C}">
+                <a14:useLocalDpi xmlns:a14="http://schemas.microsoft.com/office/drawing/2010/main" val="0"/>
+              </a:ext>
+            </a:extLst>
+          </a:blip>
+          <a:srcRect l="5249" b="10897"/>
+          <a:stretch/>
+        </p:blipFill>
+        <p:spPr>
+          <a:xfrm>
+            <a:off x="2572055" y="3430689"/>
+            <a:ext cx="2252648" cy="1629524"/>
+          </a:xfrm>
+          <a:prstGeom prst="rect">
+            <a:avLst/>
+          </a:prstGeom>
+        </p:spPr>
+      </p:pic>
+      <p:pic>
+        <p:nvPicPr>
+          <p:cNvPr id="6" name="Picture 5"/>
+          <p:cNvPicPr>
+            <a:picLocks noChangeAspect="1"/>
+          </p:cNvPicPr>
+          <p:nvPr/>
+        </p:nvPicPr>
+        <p:blipFill rotWithShape="1">
+          <a:blip r:embed="rId12">
+            <a:extLst>
+              <a:ext uri="{28A0092B-C50C-407E-A947-70E740481C1C}">
+                <a14:useLocalDpi xmlns:a14="http://schemas.microsoft.com/office/drawing/2010/main" val="0"/>
+              </a:ext>
+            </a:extLst>
+          </a:blip>
+          <a:srcRect l="5464" b="9965"/>
+          <a:stretch/>
+        </p:blipFill>
+        <p:spPr>
+          <a:xfrm>
+            <a:off x="4724659" y="3436224"/>
+            <a:ext cx="2247527" cy="1646558"/>
+          </a:xfrm>
+          <a:prstGeom prst="rect">
+            <a:avLst/>
+          </a:prstGeom>
+        </p:spPr>
+      </p:pic>
+      <p:pic>
+        <p:nvPicPr>
+          <p:cNvPr id="7" name="Picture 6"/>
+          <p:cNvPicPr>
+            <a:picLocks noChangeAspect="1"/>
+          </p:cNvPicPr>
+          <p:nvPr/>
+        </p:nvPicPr>
+        <p:blipFill rotWithShape="1">
+          <a:blip r:embed="rId13">
+            <a:extLst>
+              <a:ext uri="{28A0092B-C50C-407E-A947-70E740481C1C}">
+                <a14:useLocalDpi xmlns:a14="http://schemas.microsoft.com/office/drawing/2010/main" val="0"/>
+              </a:ext>
+            </a:extLst>
+          </a:blip>
+          <a:srcRect l="5069" b="9635"/>
+          <a:stretch/>
+        </p:blipFill>
+        <p:spPr>
+          <a:xfrm>
+            <a:off x="6880003" y="3430191"/>
+            <a:ext cx="2256926" cy="1652591"/>
+          </a:xfrm>
+          <a:prstGeom prst="rect">
+            <a:avLst/>
+          </a:prstGeom>
+        </p:spPr>
+      </p:pic>
     </p:spTree>
     <p:extLst>
       <p:ext uri="{BB962C8B-B14F-4D97-AF65-F5344CB8AC3E}">
@@ -7093,14 +7100,14 @@
           <a:effectLst/>
           <a:extLst>
             <a:ext uri="{909E8E84-426E-40dd-AFC4-6F175D3DCCD1}">
-              <a14:hiddenFill xmlns="" xmlns:a14="http://schemas.microsoft.com/office/drawing/2010/main">
+              <a14:hiddenFill xmlns:a14="http://schemas.microsoft.com/office/drawing/2010/main" xmlns="">
                 <a:solidFill>
                   <a:schemeClr val="accent1"/>
                 </a:solidFill>
               </a14:hiddenFill>
             </a:ext>
             <a:ext uri="{AF507438-7753-43e0-B8FC-AC1667EBCBE1}">
-              <a14:hiddenEffects xmlns="" xmlns:a14="http://schemas.microsoft.com/office/drawing/2010/main">
+              <a14:hiddenEffects xmlns:a14="http://schemas.microsoft.com/office/drawing/2010/main" xmlns="">
                 <a:effectLst>
                   <a:outerShdw blurRad="63500" dist="38099" dir="2700000" algn="ctr" rotWithShape="0">
                     <a:schemeClr val="bg2">
@@ -7155,6 +7162,13 @@
   <p:clrMapOvr>
     <a:masterClrMapping/>
   </p:clrMapOvr>
+  <p:timing>
+    <p:tnLst>
+      <p:par>
+        <p:cTn id="1" dur="indefinite" restart="never" nodeType="tmRoot"/>
+      </p:par>
+    </p:tnLst>
+  </p:timing>
 </p:sld>
 </file>
 

</xml_diff>